<commit_message>
Added logo to beginner lessons, updated many advanced, added Coach Corner 9
</commit_message>
<xml_diff>
--- a/translations/en-us/advanced/Arrays.pptx
+++ b/translations/en-us/advanced/Arrays.pptx
@@ -227,7 +227,7 @@
           <a:p>
             <a:fld id="{E354B44E-40A3-0E46-B16A-9BF1250A248B}" type="datetimeFigureOut">
               <a:rPr lang="en-US" smtClean="0"/>
-              <a:t>11/15/15</a:t>
+              <a:t>7/19/16</a:t>
             </a:fld>
             <a:endParaRPr lang="en-US"/>
           </a:p>
@@ -393,7 +393,7 @@
           <a:p>
             <a:fld id="{C86AD16C-2DB4-6642-BAD4-9ED973A087A0}" type="datetimeFigureOut">
               <a:rPr lang="en-US" smtClean="0"/>
-              <a:t>11/15/15</a:t>
+              <a:t>7/19/16</a:t>
             </a:fld>
             <a:endParaRPr lang="en-US"/>
           </a:p>
@@ -1114,9 +1114,9 @@
           <a:bodyPr/>
           <a:lstStyle/>
           <a:p>
-            <a:fld id="{3E16403F-CCAE-D746-A57E-1627703E2984}" type="datetime1">
+            <a:fld id="{CE774344-47E4-9C42-A68A-1A3CC734C5D5}" type="datetime1">
               <a:rPr lang="en-US" smtClean="0"/>
-              <a:t>11/15/15</a:t>
+              <a:t>7/19/16</a:t>
             </a:fld>
             <a:endParaRPr lang="en-US"/>
           </a:p>
@@ -1138,8 +1138,8 @@
           <a:lstStyle/>
           <a:p>
             <a:r>
-              <a:rPr lang="en-US" smtClean="0"/>
-              <a:t>© 2015 EV3Lessons.com, Last edit 6/15/2015</a:t>
+              <a:rPr lang="sk-SK" smtClean="0"/>
+              <a:t>© 2016 EV3Lessons.com, Last edit 7/19/2016</a:t>
             </a:r>
             <a:endParaRPr lang="en-US" dirty="0"/>
           </a:p>
@@ -1667,7 +1667,7 @@
           <a:noFill/>
           <a:extLst>
             <a:ext uri="{909E8E84-426E-40dd-AFC4-6F175D3DCCD1}">
-              <a14:hiddenFill xmlns="" xmlns:a14="http://schemas.microsoft.com/office/drawing/2010/main">
+              <a14:hiddenFill xmlns:a14="http://schemas.microsoft.com/office/drawing/2010/main" xmlns="">
                 <a:solidFill>
                   <a:srgbClr val="FFFFFF"/>
                 </a:solidFill>
@@ -1711,288 +1711,6 @@
           </a:fontRef>
         </p:style>
       </p:cxnSp>
-      <p:pic>
-        <p:nvPicPr>
-          <p:cNvPr id="12" name="Picture 11"/>
-          <p:cNvPicPr>
-            <a:picLocks noChangeAspect="1"/>
-          </p:cNvPicPr>
-          <p:nvPr/>
-        </p:nvPicPr>
-        <p:blipFill>
-          <a:blip r:embed="rId3">
-            <a:extLst>
-              <a:ext uri="{28A0092B-C50C-407E-A947-70E740481C1C}">
-                <a14:useLocalDpi xmlns:a14="http://schemas.microsoft.com/office/drawing/2010/main" val="0"/>
-              </a:ext>
-            </a:extLst>
-          </a:blip>
-          <a:stretch>
-            <a:fillRect/>
-          </a:stretch>
-        </p:blipFill>
-        <p:spPr>
-          <a:xfrm>
-            <a:off x="284163" y="4948514"/>
-            <a:ext cx="1265237" cy="1210410"/>
-          </a:xfrm>
-          <a:prstGeom prst="rect">
-            <a:avLst/>
-          </a:prstGeom>
-        </p:spPr>
-      </p:pic>
-      <p:sp>
-        <p:nvSpPr>
-          <p:cNvPr id="18" name="Subtitle 3"/>
-          <p:cNvSpPr txBox="1">
-            <a:spLocks/>
-          </p:cNvSpPr>
-          <p:nvPr/>
-        </p:nvSpPr>
-        <p:spPr>
-          <a:xfrm>
-            <a:off x="1549400" y="5829838"/>
-            <a:ext cx="3749229" cy="484094"/>
-          </a:xfrm>
-          <a:prstGeom prst="rect">
-            <a:avLst/>
-          </a:prstGeom>
-        </p:spPr>
-        <p:txBody>
-          <a:bodyPr vert="horz" lIns="91440" tIns="45720" rIns="91440" bIns="45720" rtlCol="0">
-            <a:normAutofit/>
-          </a:bodyPr>
-          <a:lstStyle>
-            <a:lvl1pPr marL="0" indent="0" algn="l" defTabSz="914400" rtl="0" eaLnBrk="1" latinLnBrk="0" hangingPunct="1">
-              <a:lnSpc>
-                <a:spcPct val="100000"/>
-              </a:lnSpc>
-              <a:spcBef>
-                <a:spcPts val="0"/>
-              </a:spcBef>
-              <a:buClr>
-                <a:schemeClr val="bg1">
-                  <a:lumMod val="65000"/>
-                </a:schemeClr>
-              </a:buClr>
-              <a:buSzPct val="90000"/>
-              <a:buFont typeface="Wingdings" pitchFamily="2" charset="2"/>
-              <a:buNone/>
-              <a:defRPr sz="1800" kern="1200">
-                <a:solidFill>
-                  <a:schemeClr val="bg1"/>
-                </a:solidFill>
-                <a:latin typeface="+mn-lt"/>
-                <a:ea typeface="+mn-ea"/>
-                <a:cs typeface="+mn-cs"/>
-              </a:defRPr>
-            </a:lvl1pPr>
-            <a:lvl2pPr marL="457200" indent="0" algn="ctr" defTabSz="914400" rtl="0" eaLnBrk="1" latinLnBrk="0" hangingPunct="1">
-              <a:spcBef>
-                <a:spcPts val="600"/>
-              </a:spcBef>
-              <a:buClr>
-                <a:schemeClr val="tx1">
-                  <a:lumMod val="75000"/>
-                  <a:lumOff val="25000"/>
-                </a:schemeClr>
-              </a:buClr>
-              <a:buSzPct val="90000"/>
-              <a:buFont typeface="Wingdings" pitchFamily="2" charset="2"/>
-              <a:buNone/>
-              <a:defRPr sz="2200" kern="1200">
-                <a:solidFill>
-                  <a:schemeClr val="tx1">
-                    <a:tint val="75000"/>
-                  </a:schemeClr>
-                </a:solidFill>
-                <a:latin typeface="+mn-lt"/>
-                <a:ea typeface="+mn-ea"/>
-                <a:cs typeface="+mn-cs"/>
-              </a:defRPr>
-            </a:lvl2pPr>
-            <a:lvl3pPr marL="914400" indent="0" algn="ctr" defTabSz="914400" rtl="0" eaLnBrk="1" latinLnBrk="0" hangingPunct="1">
-              <a:spcBef>
-                <a:spcPts val="600"/>
-              </a:spcBef>
-              <a:buClr>
-                <a:schemeClr val="bg1">
-                  <a:lumMod val="65000"/>
-                </a:schemeClr>
-              </a:buClr>
-              <a:buSzPct val="90000"/>
-              <a:buFont typeface="Wingdings" pitchFamily="2" charset="2"/>
-              <a:buNone/>
-              <a:defRPr sz="2000" kern="1200">
-                <a:solidFill>
-                  <a:schemeClr val="tx1">
-                    <a:tint val="75000"/>
-                  </a:schemeClr>
-                </a:solidFill>
-                <a:latin typeface="+mn-lt"/>
-                <a:ea typeface="+mn-ea"/>
-                <a:cs typeface="+mn-cs"/>
-              </a:defRPr>
-            </a:lvl3pPr>
-            <a:lvl4pPr marL="1371600" indent="0" algn="ctr" defTabSz="914400" rtl="0" eaLnBrk="1" latinLnBrk="0" hangingPunct="1">
-              <a:spcBef>
-                <a:spcPts val="600"/>
-              </a:spcBef>
-              <a:buClr>
-                <a:schemeClr val="tx1">
-                  <a:lumMod val="75000"/>
-                  <a:lumOff val="25000"/>
-                </a:schemeClr>
-              </a:buClr>
-              <a:buSzPct val="90000"/>
-              <a:buFont typeface="Wingdings" pitchFamily="2" charset="2"/>
-              <a:buNone/>
-              <a:defRPr sz="1800" kern="1200">
-                <a:solidFill>
-                  <a:schemeClr val="tx1">
-                    <a:tint val="75000"/>
-                  </a:schemeClr>
-                </a:solidFill>
-                <a:latin typeface="+mn-lt"/>
-                <a:ea typeface="+mn-ea"/>
-                <a:cs typeface="+mn-cs"/>
-              </a:defRPr>
-            </a:lvl4pPr>
-            <a:lvl5pPr marL="1828800" indent="0" algn="ctr" defTabSz="914400" rtl="0" eaLnBrk="1" latinLnBrk="0" hangingPunct="1">
-              <a:spcBef>
-                <a:spcPts val="600"/>
-              </a:spcBef>
-              <a:buClr>
-                <a:schemeClr val="bg1">
-                  <a:lumMod val="65000"/>
-                </a:schemeClr>
-              </a:buClr>
-              <a:buSzPct val="90000"/>
-              <a:buFont typeface="Wingdings" pitchFamily="2" charset="2"/>
-              <a:buNone/>
-              <a:defRPr sz="1800" kern="1200">
-                <a:solidFill>
-                  <a:schemeClr val="tx1">
-                    <a:tint val="75000"/>
-                  </a:schemeClr>
-                </a:solidFill>
-                <a:latin typeface="+mn-lt"/>
-                <a:ea typeface="+mn-ea"/>
-                <a:cs typeface="+mn-cs"/>
-              </a:defRPr>
-            </a:lvl5pPr>
-            <a:lvl6pPr marL="2286000" indent="0" algn="ctr" defTabSz="914400" rtl="0" eaLnBrk="1" latinLnBrk="0" hangingPunct="1">
-              <a:spcBef>
-                <a:spcPts val="600"/>
-              </a:spcBef>
-              <a:buClr>
-                <a:schemeClr val="tx1">
-                  <a:lumMod val="75000"/>
-                  <a:lumOff val="25000"/>
-                </a:schemeClr>
-              </a:buClr>
-              <a:buSzPct val="90000"/>
-              <a:buFont typeface="Wingdings" pitchFamily="2" charset="2"/>
-              <a:buNone/>
-              <a:defRPr lang="en-US" sz="1800" kern="1200">
-                <a:solidFill>
-                  <a:schemeClr val="tx1">
-                    <a:tint val="75000"/>
-                  </a:schemeClr>
-                </a:solidFill>
-                <a:latin typeface="+mn-lt"/>
-                <a:ea typeface="+mn-ea"/>
-                <a:cs typeface="+mn-cs"/>
-              </a:defRPr>
-            </a:lvl6pPr>
-            <a:lvl7pPr marL="2743200" indent="0" algn="ctr" defTabSz="914400" rtl="0" eaLnBrk="1" latinLnBrk="0" hangingPunct="1">
-              <a:spcBef>
-                <a:spcPts val="600"/>
-              </a:spcBef>
-              <a:buClr>
-                <a:schemeClr val="bg1">
-                  <a:lumMod val="65000"/>
-                </a:schemeClr>
-              </a:buClr>
-              <a:buSzPct val="90000"/>
-              <a:buFont typeface="Wingdings" pitchFamily="2" charset="2"/>
-              <a:buNone/>
-              <a:defRPr lang="en-US" sz="1800" kern="1200">
-                <a:solidFill>
-                  <a:schemeClr val="tx1">
-                    <a:tint val="75000"/>
-                  </a:schemeClr>
-                </a:solidFill>
-                <a:latin typeface="+mn-lt"/>
-                <a:ea typeface="+mn-ea"/>
-                <a:cs typeface="+mn-cs"/>
-              </a:defRPr>
-            </a:lvl7pPr>
-            <a:lvl8pPr marL="3200400" indent="0" algn="ctr" defTabSz="914400" rtl="0" eaLnBrk="1" latinLnBrk="0" hangingPunct="1">
-              <a:spcBef>
-                <a:spcPts val="600"/>
-              </a:spcBef>
-              <a:buClr>
-                <a:schemeClr val="tx1">
-                  <a:lumMod val="75000"/>
-                  <a:lumOff val="25000"/>
-                </a:schemeClr>
-              </a:buClr>
-              <a:buSzPct val="90000"/>
-              <a:buFont typeface="Wingdings" pitchFamily="2" charset="2"/>
-              <a:buNone/>
-              <a:defRPr lang="en-US" sz="1800" kern="1200">
-                <a:solidFill>
-                  <a:schemeClr val="tx1">
-                    <a:tint val="75000"/>
-                  </a:schemeClr>
-                </a:solidFill>
-                <a:latin typeface="+mn-lt"/>
-                <a:ea typeface="+mn-ea"/>
-                <a:cs typeface="+mn-cs"/>
-              </a:defRPr>
-            </a:lvl8pPr>
-            <a:lvl9pPr marL="3657600" indent="0" algn="ctr" defTabSz="914400" rtl="0" eaLnBrk="1" latinLnBrk="0" hangingPunct="1">
-              <a:spcBef>
-                <a:spcPts val="600"/>
-              </a:spcBef>
-              <a:buClr>
-                <a:schemeClr val="bg1">
-                  <a:lumMod val="65000"/>
-                </a:schemeClr>
-              </a:buClr>
-              <a:buSzPct val="90000"/>
-              <a:buFont typeface="Wingdings" pitchFamily="2" charset="2"/>
-              <a:buNone/>
-              <a:defRPr lang="en-US" sz="1800" kern="1200">
-                <a:solidFill>
-                  <a:schemeClr val="tx1">
-                    <a:tint val="75000"/>
-                  </a:schemeClr>
-                </a:solidFill>
-                <a:latin typeface="+mn-lt"/>
-                <a:ea typeface="+mn-ea"/>
-                <a:cs typeface="+mn-cs"/>
-              </a:defRPr>
-            </a:lvl9pPr>
-          </a:lstStyle>
-          <a:p>
-            <a:r>
-              <a:rPr lang="en-US" dirty="0" smtClean="0">
-                <a:solidFill>
-                  <a:schemeClr val="tx1"/>
-                </a:solidFill>
-              </a:rPr>
-              <a:t>By Droids Robotics</a:t>
-            </a:r>
-            <a:endParaRPr lang="en-US" dirty="0">
-              <a:solidFill>
-                <a:schemeClr val="tx1"/>
-              </a:solidFill>
-            </a:endParaRPr>
-          </a:p>
-        </p:txBody>
-      </p:sp>
       <p:sp>
         <p:nvSpPr>
           <p:cNvPr id="19" name="TextBox 18"/>
@@ -2063,7 +1781,7 @@
           <a:noFill/>
           <a:extLst>
             <a:ext uri="{909E8E84-426E-40dd-AFC4-6F175D3DCCD1}">
-              <a14:hiddenFill xmlns="" xmlns:a14="http://schemas.microsoft.com/office/drawing/2010/main">
+              <a14:hiddenFill xmlns:a14="http://schemas.microsoft.com/office/drawing/2010/main" xmlns="">
                 <a:solidFill>
                   <a:srgbClr val="FFFFFF"/>
                 </a:solidFill>
@@ -2107,288 +1825,6 @@
           </a:fontRef>
         </p:style>
       </p:cxnSp>
-      <p:pic>
-        <p:nvPicPr>
-          <p:cNvPr id="22" name="Picture 21"/>
-          <p:cNvPicPr>
-            <a:picLocks noChangeAspect="1"/>
-          </p:cNvPicPr>
-          <p:nvPr userDrawn="1"/>
-        </p:nvPicPr>
-        <p:blipFill>
-          <a:blip r:embed="rId3">
-            <a:extLst>
-              <a:ext uri="{28A0092B-C50C-407E-A947-70E740481C1C}">
-                <a14:useLocalDpi xmlns:a14="http://schemas.microsoft.com/office/drawing/2010/main" val="0"/>
-              </a:ext>
-            </a:extLst>
-          </a:blip>
-          <a:stretch>
-            <a:fillRect/>
-          </a:stretch>
-        </p:blipFill>
-        <p:spPr>
-          <a:xfrm>
-            <a:off x="284163" y="4948514"/>
-            <a:ext cx="1265237" cy="1210410"/>
-          </a:xfrm>
-          <a:prstGeom prst="rect">
-            <a:avLst/>
-          </a:prstGeom>
-        </p:spPr>
-      </p:pic>
-      <p:sp>
-        <p:nvSpPr>
-          <p:cNvPr id="23" name="Subtitle 3"/>
-          <p:cNvSpPr txBox="1">
-            <a:spLocks/>
-          </p:cNvSpPr>
-          <p:nvPr userDrawn="1"/>
-        </p:nvSpPr>
-        <p:spPr>
-          <a:xfrm>
-            <a:off x="1549400" y="5829838"/>
-            <a:ext cx="3749229" cy="484094"/>
-          </a:xfrm>
-          <a:prstGeom prst="rect">
-            <a:avLst/>
-          </a:prstGeom>
-        </p:spPr>
-        <p:txBody>
-          <a:bodyPr vert="horz" lIns="91440" tIns="45720" rIns="91440" bIns="45720" rtlCol="0">
-            <a:normAutofit/>
-          </a:bodyPr>
-          <a:lstStyle>
-            <a:lvl1pPr marL="0" indent="0" algn="l" defTabSz="914400" rtl="0" eaLnBrk="1" latinLnBrk="0" hangingPunct="1">
-              <a:lnSpc>
-                <a:spcPct val="100000"/>
-              </a:lnSpc>
-              <a:spcBef>
-                <a:spcPts val="0"/>
-              </a:spcBef>
-              <a:buClr>
-                <a:schemeClr val="bg1">
-                  <a:lumMod val="65000"/>
-                </a:schemeClr>
-              </a:buClr>
-              <a:buSzPct val="90000"/>
-              <a:buFont typeface="Wingdings" pitchFamily="2" charset="2"/>
-              <a:buNone/>
-              <a:defRPr sz="1800" kern="1200">
-                <a:solidFill>
-                  <a:schemeClr val="bg1"/>
-                </a:solidFill>
-                <a:latin typeface="+mn-lt"/>
-                <a:ea typeface="+mn-ea"/>
-                <a:cs typeface="+mn-cs"/>
-              </a:defRPr>
-            </a:lvl1pPr>
-            <a:lvl2pPr marL="457200" indent="0" algn="ctr" defTabSz="914400" rtl="0" eaLnBrk="1" latinLnBrk="0" hangingPunct="1">
-              <a:spcBef>
-                <a:spcPts val="600"/>
-              </a:spcBef>
-              <a:buClr>
-                <a:schemeClr val="tx1">
-                  <a:lumMod val="75000"/>
-                  <a:lumOff val="25000"/>
-                </a:schemeClr>
-              </a:buClr>
-              <a:buSzPct val="90000"/>
-              <a:buFont typeface="Wingdings" pitchFamily="2" charset="2"/>
-              <a:buNone/>
-              <a:defRPr sz="2200" kern="1200">
-                <a:solidFill>
-                  <a:schemeClr val="tx1">
-                    <a:tint val="75000"/>
-                  </a:schemeClr>
-                </a:solidFill>
-                <a:latin typeface="+mn-lt"/>
-                <a:ea typeface="+mn-ea"/>
-                <a:cs typeface="+mn-cs"/>
-              </a:defRPr>
-            </a:lvl2pPr>
-            <a:lvl3pPr marL="914400" indent="0" algn="ctr" defTabSz="914400" rtl="0" eaLnBrk="1" latinLnBrk="0" hangingPunct="1">
-              <a:spcBef>
-                <a:spcPts val="600"/>
-              </a:spcBef>
-              <a:buClr>
-                <a:schemeClr val="bg1">
-                  <a:lumMod val="65000"/>
-                </a:schemeClr>
-              </a:buClr>
-              <a:buSzPct val="90000"/>
-              <a:buFont typeface="Wingdings" pitchFamily="2" charset="2"/>
-              <a:buNone/>
-              <a:defRPr sz="2000" kern="1200">
-                <a:solidFill>
-                  <a:schemeClr val="tx1">
-                    <a:tint val="75000"/>
-                  </a:schemeClr>
-                </a:solidFill>
-                <a:latin typeface="+mn-lt"/>
-                <a:ea typeface="+mn-ea"/>
-                <a:cs typeface="+mn-cs"/>
-              </a:defRPr>
-            </a:lvl3pPr>
-            <a:lvl4pPr marL="1371600" indent="0" algn="ctr" defTabSz="914400" rtl="0" eaLnBrk="1" latinLnBrk="0" hangingPunct="1">
-              <a:spcBef>
-                <a:spcPts val="600"/>
-              </a:spcBef>
-              <a:buClr>
-                <a:schemeClr val="tx1">
-                  <a:lumMod val="75000"/>
-                  <a:lumOff val="25000"/>
-                </a:schemeClr>
-              </a:buClr>
-              <a:buSzPct val="90000"/>
-              <a:buFont typeface="Wingdings" pitchFamily="2" charset="2"/>
-              <a:buNone/>
-              <a:defRPr sz="1800" kern="1200">
-                <a:solidFill>
-                  <a:schemeClr val="tx1">
-                    <a:tint val="75000"/>
-                  </a:schemeClr>
-                </a:solidFill>
-                <a:latin typeface="+mn-lt"/>
-                <a:ea typeface="+mn-ea"/>
-                <a:cs typeface="+mn-cs"/>
-              </a:defRPr>
-            </a:lvl4pPr>
-            <a:lvl5pPr marL="1828800" indent="0" algn="ctr" defTabSz="914400" rtl="0" eaLnBrk="1" latinLnBrk="0" hangingPunct="1">
-              <a:spcBef>
-                <a:spcPts val="600"/>
-              </a:spcBef>
-              <a:buClr>
-                <a:schemeClr val="bg1">
-                  <a:lumMod val="65000"/>
-                </a:schemeClr>
-              </a:buClr>
-              <a:buSzPct val="90000"/>
-              <a:buFont typeface="Wingdings" pitchFamily="2" charset="2"/>
-              <a:buNone/>
-              <a:defRPr sz="1800" kern="1200">
-                <a:solidFill>
-                  <a:schemeClr val="tx1">
-                    <a:tint val="75000"/>
-                  </a:schemeClr>
-                </a:solidFill>
-                <a:latin typeface="+mn-lt"/>
-                <a:ea typeface="+mn-ea"/>
-                <a:cs typeface="+mn-cs"/>
-              </a:defRPr>
-            </a:lvl5pPr>
-            <a:lvl6pPr marL="2286000" indent="0" algn="ctr" defTabSz="914400" rtl="0" eaLnBrk="1" latinLnBrk="0" hangingPunct="1">
-              <a:spcBef>
-                <a:spcPts val="600"/>
-              </a:spcBef>
-              <a:buClr>
-                <a:schemeClr val="tx1">
-                  <a:lumMod val="75000"/>
-                  <a:lumOff val="25000"/>
-                </a:schemeClr>
-              </a:buClr>
-              <a:buSzPct val="90000"/>
-              <a:buFont typeface="Wingdings" pitchFamily="2" charset="2"/>
-              <a:buNone/>
-              <a:defRPr lang="en-US" sz="1800" kern="1200">
-                <a:solidFill>
-                  <a:schemeClr val="tx1">
-                    <a:tint val="75000"/>
-                  </a:schemeClr>
-                </a:solidFill>
-                <a:latin typeface="+mn-lt"/>
-                <a:ea typeface="+mn-ea"/>
-                <a:cs typeface="+mn-cs"/>
-              </a:defRPr>
-            </a:lvl6pPr>
-            <a:lvl7pPr marL="2743200" indent="0" algn="ctr" defTabSz="914400" rtl="0" eaLnBrk="1" latinLnBrk="0" hangingPunct="1">
-              <a:spcBef>
-                <a:spcPts val="600"/>
-              </a:spcBef>
-              <a:buClr>
-                <a:schemeClr val="bg1">
-                  <a:lumMod val="65000"/>
-                </a:schemeClr>
-              </a:buClr>
-              <a:buSzPct val="90000"/>
-              <a:buFont typeface="Wingdings" pitchFamily="2" charset="2"/>
-              <a:buNone/>
-              <a:defRPr lang="en-US" sz="1800" kern="1200">
-                <a:solidFill>
-                  <a:schemeClr val="tx1">
-                    <a:tint val="75000"/>
-                  </a:schemeClr>
-                </a:solidFill>
-                <a:latin typeface="+mn-lt"/>
-                <a:ea typeface="+mn-ea"/>
-                <a:cs typeface="+mn-cs"/>
-              </a:defRPr>
-            </a:lvl7pPr>
-            <a:lvl8pPr marL="3200400" indent="0" algn="ctr" defTabSz="914400" rtl="0" eaLnBrk="1" latinLnBrk="0" hangingPunct="1">
-              <a:spcBef>
-                <a:spcPts val="600"/>
-              </a:spcBef>
-              <a:buClr>
-                <a:schemeClr val="tx1">
-                  <a:lumMod val="75000"/>
-                  <a:lumOff val="25000"/>
-                </a:schemeClr>
-              </a:buClr>
-              <a:buSzPct val="90000"/>
-              <a:buFont typeface="Wingdings" pitchFamily="2" charset="2"/>
-              <a:buNone/>
-              <a:defRPr lang="en-US" sz="1800" kern="1200">
-                <a:solidFill>
-                  <a:schemeClr val="tx1">
-                    <a:tint val="75000"/>
-                  </a:schemeClr>
-                </a:solidFill>
-                <a:latin typeface="+mn-lt"/>
-                <a:ea typeface="+mn-ea"/>
-                <a:cs typeface="+mn-cs"/>
-              </a:defRPr>
-            </a:lvl8pPr>
-            <a:lvl9pPr marL="3657600" indent="0" algn="ctr" defTabSz="914400" rtl="0" eaLnBrk="1" latinLnBrk="0" hangingPunct="1">
-              <a:spcBef>
-                <a:spcPts val="600"/>
-              </a:spcBef>
-              <a:buClr>
-                <a:schemeClr val="bg1">
-                  <a:lumMod val="65000"/>
-                </a:schemeClr>
-              </a:buClr>
-              <a:buSzPct val="90000"/>
-              <a:buFont typeface="Wingdings" pitchFamily="2" charset="2"/>
-              <a:buNone/>
-              <a:defRPr lang="en-US" sz="1800" kern="1200">
-                <a:solidFill>
-                  <a:schemeClr val="tx1">
-                    <a:tint val="75000"/>
-                  </a:schemeClr>
-                </a:solidFill>
-                <a:latin typeface="+mn-lt"/>
-                <a:ea typeface="+mn-ea"/>
-                <a:cs typeface="+mn-cs"/>
-              </a:defRPr>
-            </a:lvl9pPr>
-          </a:lstStyle>
-          <a:p>
-            <a:r>
-              <a:rPr lang="en-US" dirty="0" smtClean="0">
-                <a:solidFill>
-                  <a:schemeClr val="tx1"/>
-                </a:solidFill>
-              </a:rPr>
-              <a:t>By Droids Robotics</a:t>
-            </a:r>
-            <a:endParaRPr lang="en-US" dirty="0">
-              <a:solidFill>
-                <a:schemeClr val="tx1"/>
-              </a:solidFill>
-            </a:endParaRPr>
-          </a:p>
-        </p:txBody>
-      </p:sp>
     </p:spTree>
     <p:extLst>
       <p:ext uri="{BB962C8B-B14F-4D97-AF65-F5344CB8AC3E}">
@@ -2497,9 +1933,9 @@
           <a:bodyPr/>
           <a:lstStyle/>
           <a:p>
-            <a:fld id="{F92C6EB1-657D-2348-80B0-7CB46A48D38A}" type="datetime1">
+            <a:fld id="{25719CEC-6FE2-A64D-B07C-426A372ADBCF}" type="datetime1">
               <a:rPr lang="en-US" smtClean="0"/>
-              <a:t>11/15/15</a:t>
+              <a:t>7/19/16</a:t>
             </a:fld>
             <a:endParaRPr lang="en-US"/>
           </a:p>
@@ -2522,7 +1958,7 @@
           <a:p>
             <a:r>
               <a:rPr lang="sk-SK" smtClean="0"/>
-              <a:t>© 2015 EV3Lessons.com, Last edit 6/15/2015</a:t>
+              <a:t>© 2016 EV3Lessons.com, Last edit 7/19/2016</a:t>
             </a:r>
             <a:endParaRPr lang="en-US"/>
           </a:p>
@@ -2955,9 +2391,9 @@
           <a:bodyPr/>
           <a:lstStyle/>
           <a:p>
-            <a:fld id="{1CDB5AB7-AE0F-5847-8879-D95658F19187}" type="datetime1">
+            <a:fld id="{1BA8BB39-6E71-4C41-BE36-BE50F4539595}" type="datetime1">
               <a:rPr lang="en-US" smtClean="0"/>
-              <a:t>11/15/15</a:t>
+              <a:t>7/19/16</a:t>
             </a:fld>
             <a:endParaRPr lang="en-US"/>
           </a:p>
@@ -2980,7 +2416,7 @@
           <a:p>
             <a:r>
               <a:rPr lang="sk-SK" smtClean="0"/>
-              <a:t>© 2015 EV3Lessons.com, Last edit 6/15/2015</a:t>
+              <a:t>© 2016 EV3Lessons.com, Last edit 7/19/2016</a:t>
             </a:r>
             <a:endParaRPr lang="en-US"/>
           </a:p>
@@ -3406,9 +2842,9 @@
           <a:bodyPr/>
           <a:lstStyle/>
           <a:p>
-            <a:fld id="{7C5F0E2F-9F6B-F947-B1CD-A0F2BCA4BDD0}" type="datetime1">
+            <a:fld id="{8299BDD0-4580-034A-9FC8-EC7CE894E8F9}" type="datetime1">
               <a:rPr lang="en-US" smtClean="0"/>
-              <a:t>11/15/15</a:t>
+              <a:t>7/19/16</a:t>
             </a:fld>
             <a:endParaRPr lang="en-US"/>
           </a:p>
@@ -3988,9 +3424,9 @@
           <a:bodyPr/>
           <a:lstStyle/>
           <a:p>
-            <a:fld id="{24B60D1B-E521-6349-AE89-A4AB5C25F0E0}" type="datetime1">
+            <a:fld id="{AE4750A3-BA90-314E-98DD-405269803D7C}" type="datetime1">
               <a:rPr lang="en-US" smtClean="0"/>
-              <a:t>11/15/15</a:t>
+              <a:t>7/19/16</a:t>
             </a:fld>
             <a:endParaRPr lang="en-US"/>
           </a:p>
@@ -4013,7 +3449,7 @@
           <a:p>
             <a:r>
               <a:rPr lang="sk-SK" smtClean="0"/>
-              <a:t>© 2015 EV3Lessons.com, Last edit 6/15/2015</a:t>
+              <a:t>© 2016 EV3Lessons.com, Last edit 7/19/2016</a:t>
             </a:r>
             <a:endParaRPr lang="en-US"/>
           </a:p>
@@ -4265,9 +3701,9 @@
           <a:bodyPr/>
           <a:lstStyle/>
           <a:p>
-            <a:fld id="{40D6C455-5B63-8940-9B32-276BD6D824BD}" type="datetime1">
+            <a:fld id="{FECAE974-8E73-564A-91C1-A77E64036851}" type="datetime1">
               <a:rPr lang="en-US" smtClean="0"/>
-              <a:t>11/15/15</a:t>
+              <a:t>7/19/16</a:t>
             </a:fld>
             <a:endParaRPr lang="en-US"/>
           </a:p>
@@ -4290,7 +3726,7 @@
           <a:p>
             <a:r>
               <a:rPr lang="sk-SK" smtClean="0"/>
-              <a:t>© 2015 EV3Lessons.com, Last edit 6/15/2015</a:t>
+              <a:t>© 2016 EV3Lessons.com, Last edit 7/19/2016</a:t>
             </a:r>
             <a:endParaRPr lang="en-US"/>
           </a:p>
@@ -4580,9 +4016,9 @@
           <a:bodyPr/>
           <a:lstStyle/>
           <a:p>
-            <a:fld id="{942050CC-28F4-DF42-AF3A-74589E4DA979}" type="datetime1">
+            <a:fld id="{D066916C-6CCD-784C-939B-117B67BCC917}" type="datetime1">
               <a:rPr lang="en-US" smtClean="0"/>
-              <a:t>11/15/15</a:t>
+              <a:t>7/19/16</a:t>
             </a:fld>
             <a:endParaRPr lang="en-US"/>
           </a:p>
@@ -4605,7 +4041,7 @@
           <a:p>
             <a:r>
               <a:rPr lang="sk-SK" smtClean="0"/>
-              <a:t>© 2015 EV3Lessons.com, Last edit 6/15/2015</a:t>
+              <a:t>© 2016 EV3Lessons.com, Last edit 7/19/2016</a:t>
             </a:r>
             <a:endParaRPr lang="en-US"/>
           </a:p>
@@ -4804,9 +4240,9 @@
           <a:bodyPr/>
           <a:lstStyle/>
           <a:p>
-            <a:fld id="{0B09783E-33B5-414F-A6F3-EB17950DAF9B}" type="datetime1">
+            <a:fld id="{8BD69708-2E89-FD46-A763-CCA61E31711E}" type="datetime1">
               <a:rPr lang="en-US" smtClean="0"/>
-              <a:t>11/15/15</a:t>
+              <a:t>7/19/16</a:t>
             </a:fld>
             <a:endParaRPr lang="en-US"/>
           </a:p>
@@ -4829,7 +4265,7 @@
           <a:p>
             <a:r>
               <a:rPr lang="sk-SK" smtClean="0"/>
-              <a:t>© 2015 EV3Lessons.com, Last edit 6/15/2015</a:t>
+              <a:t>© 2016 EV3Lessons.com, Last edit 7/19/2016</a:t>
             </a:r>
             <a:endParaRPr lang="en-US"/>
           </a:p>
@@ -5114,9 +4550,9 @@
           <a:bodyPr/>
           <a:lstStyle/>
           <a:p>
-            <a:fld id="{F92C6EB1-657D-2348-80B0-7CB46A48D38A}" type="datetime1">
+            <a:fld id="{A5B86BB1-538C-2341-A743-F9AC65ABD809}" type="datetime1">
               <a:rPr lang="en-US" smtClean="0"/>
-              <a:t>11/15/15</a:t>
+              <a:t>7/19/16</a:t>
             </a:fld>
             <a:endParaRPr lang="en-US"/>
           </a:p>
@@ -5139,7 +4575,7 @@
           <a:p>
             <a:r>
               <a:rPr lang="sk-SK" smtClean="0"/>
-              <a:t>© 2015 EV3Lessons.com, Last edit 6/15/2015</a:t>
+              <a:t>© 2016 EV3Lessons.com, Last edit 7/19/2016</a:t>
             </a:r>
             <a:endParaRPr lang="en-US"/>
           </a:p>
@@ -5730,9 +5166,9 @@
           <a:bodyPr/>
           <a:lstStyle/>
           <a:p>
-            <a:fld id="{1CDB5AB7-AE0F-5847-8879-D95658F19187}" type="datetime1">
+            <a:fld id="{4C78C368-705A-7648-8E88-27070289CFFB}" type="datetime1">
               <a:rPr lang="en-US" smtClean="0"/>
-              <a:t>11/15/15</a:t>
+              <a:t>7/19/16</a:t>
             </a:fld>
             <a:endParaRPr lang="en-US"/>
           </a:p>
@@ -5755,7 +5191,7 @@
           <a:p>
             <a:r>
               <a:rPr lang="sk-SK" smtClean="0"/>
-              <a:t>© 2015 EV3Lessons.com, Last edit 6/15/2015</a:t>
+              <a:t>© 2016 EV3Lessons.com, Last edit 7/19/2016</a:t>
             </a:r>
             <a:endParaRPr lang="en-US"/>
           </a:p>
@@ -6347,9 +5783,9 @@
           <a:bodyPr/>
           <a:lstStyle/>
           <a:p>
-            <a:fld id="{7C5F0E2F-9F6B-F947-B1CD-A0F2BCA4BDD0}" type="datetime1">
+            <a:fld id="{C6959BC2-0B22-034B-A930-44AA6DD9FEB1}" type="datetime1">
               <a:rPr lang="en-US" smtClean="0"/>
-              <a:t>11/15/15</a:t>
+              <a:t>7/19/16</a:t>
             </a:fld>
             <a:endParaRPr lang="en-US"/>
           </a:p>
@@ -7225,9 +6661,9 @@
           <a:bodyPr/>
           <a:lstStyle/>
           <a:p>
-            <a:fld id="{24B60D1B-E521-6349-AE89-A4AB5C25F0E0}" type="datetime1">
+            <a:fld id="{67D1AD19-C359-8C4E-86A6-7BAE18F50B1A}" type="datetime1">
               <a:rPr lang="en-US" smtClean="0"/>
-              <a:t>11/15/15</a:t>
+              <a:t>7/19/16</a:t>
             </a:fld>
             <a:endParaRPr lang="en-US"/>
           </a:p>
@@ -7250,7 +6686,7 @@
           <a:p>
             <a:r>
               <a:rPr lang="sk-SK" smtClean="0"/>
-              <a:t>© 2015 EV3Lessons.com, Last edit 6/15/2015</a:t>
+              <a:t>© 2016 EV3Lessons.com, Last edit 7/19/2016</a:t>
             </a:r>
             <a:endParaRPr lang="en-US"/>
           </a:p>
@@ -7660,9 +7096,9 @@
           <a:bodyPr/>
           <a:lstStyle/>
           <a:p>
-            <a:fld id="{40D6C455-5B63-8940-9B32-276BD6D824BD}" type="datetime1">
+            <a:fld id="{DA8B3459-2D2E-1542-9B54-D840F833A7DB}" type="datetime1">
               <a:rPr lang="en-US" smtClean="0"/>
-              <a:t>11/15/15</a:t>
+              <a:t>7/19/16</a:t>
             </a:fld>
             <a:endParaRPr lang="en-US"/>
           </a:p>
@@ -7685,7 +7121,7 @@
           <a:p>
             <a:r>
               <a:rPr lang="sk-SK" smtClean="0"/>
-              <a:t>© 2015 EV3Lessons.com, Last edit 6/15/2015</a:t>
+              <a:t>© 2016 EV3Lessons.com, Last edit 7/19/2016</a:t>
             </a:r>
             <a:endParaRPr lang="en-US"/>
           </a:p>
@@ -8133,9 +7569,9 @@
           <a:bodyPr/>
           <a:lstStyle/>
           <a:p>
-            <a:fld id="{942050CC-28F4-DF42-AF3A-74589E4DA979}" type="datetime1">
+            <a:fld id="{B7D0A045-34AE-B543-8FFD-E5DEB9921BF7}" type="datetime1">
               <a:rPr lang="en-US" smtClean="0"/>
-              <a:t>11/15/15</a:t>
+              <a:t>7/19/16</a:t>
             </a:fld>
             <a:endParaRPr lang="en-US"/>
           </a:p>
@@ -8158,7 +7594,7 @@
           <a:p>
             <a:r>
               <a:rPr lang="sk-SK" smtClean="0"/>
-              <a:t>© 2015 EV3Lessons.com, Last edit 6/15/2015</a:t>
+              <a:t>© 2016 EV3Lessons.com, Last edit 7/19/2016</a:t>
             </a:r>
             <a:endParaRPr lang="en-US"/>
           </a:p>
@@ -8515,9 +7951,9 @@
           <a:bodyPr/>
           <a:lstStyle/>
           <a:p>
-            <a:fld id="{0B09783E-33B5-414F-A6F3-EB17950DAF9B}" type="datetime1">
+            <a:fld id="{FC05CAC8-E3A3-9F4F-A115-9216F55B464E}" type="datetime1">
               <a:rPr lang="en-US" smtClean="0"/>
-              <a:t>11/15/15</a:t>
+              <a:t>7/19/16</a:t>
             </a:fld>
             <a:endParaRPr lang="en-US"/>
           </a:p>
@@ -8540,7 +7976,7 @@
           <a:p>
             <a:r>
               <a:rPr lang="sk-SK" smtClean="0"/>
-              <a:t>© 2015 EV3Lessons.com, Last edit 6/15/2015</a:t>
+              <a:t>© 2016 EV3Lessons.com, Last edit 7/19/2016</a:t>
             </a:r>
             <a:endParaRPr lang="en-US"/>
           </a:p>
@@ -8955,9 +8391,9 @@
           <a:bodyPr/>
           <a:lstStyle/>
           <a:p>
-            <a:fld id="{9BB45858-DAAD-704C-B8B2-5528B835482B}" type="datetime1">
+            <a:fld id="{7709EF50-100C-634D-8F67-AEC2D65E039F}" type="datetime1">
               <a:rPr lang="en-US" smtClean="0"/>
-              <a:t>11/15/15</a:t>
+              <a:t>7/19/16</a:t>
             </a:fld>
             <a:endParaRPr lang="en-US" dirty="0"/>
           </a:p>
@@ -8980,7 +8416,7 @@
           <a:p>
             <a:r>
               <a:rPr lang="sk-SK" smtClean="0"/>
-              <a:t>© 2015 EV3Lessons.com, Last edit 6/15/2015</a:t>
+              <a:t>© 2016 EV3Lessons.com, Last edit 7/19/2016</a:t>
             </a:r>
             <a:endParaRPr lang="en-US" dirty="0"/>
           </a:p>
@@ -9077,7 +8513,6 @@
   <p:clrMapOvr>
     <a:masterClrMapping/>
   </p:clrMapOvr>
-  <p:hf hdr="0" dt="0"/>
 </p:sldLayout>
 </file>
 
@@ -9201,9 +8636,9 @@
             </a:lvl1pPr>
           </a:lstStyle>
           <a:p>
-            <a:fld id="{9BB45858-DAAD-704C-B8B2-5528B835482B}" type="datetime1">
+            <a:fld id="{A17013AD-CF79-9848-8575-58E272EC5A92}" type="datetime1">
               <a:rPr lang="en-US" smtClean="0"/>
-              <a:t>11/15/15</a:t>
+              <a:t>7/19/16</a:t>
             </a:fld>
             <a:endParaRPr lang="en-US" dirty="0"/>
           </a:p>
@@ -9244,7 +8679,7 @@
           <a:p>
             <a:r>
               <a:rPr lang="sk-SK" smtClean="0"/>
-              <a:t>© 2015 EV3Lessons.com, Last edit 6/15/2015</a:t>
+              <a:t>© 2016 EV3Lessons.com, Last edit 7/19/2016</a:t>
             </a:r>
             <a:endParaRPr lang="en-US" dirty="0"/>
           </a:p>
@@ -9364,7 +8799,7 @@
       </p:par>
     </p:tnLst>
   </p:timing>
-  <p:hf hdr="0" dt="0"/>
+  <p:hf sldNum="0" hdr="0" dt="0"/>
   <p:txStyles>
     <p:titleStyle>
       <a:lvl1pPr marL="231775" indent="3175" algn="l" defTabSz="914400" rtl="0" eaLnBrk="1" latinLnBrk="0" hangingPunct="1">
@@ -9759,10 +9194,47 @@
           <a:bodyPr/>
           <a:lstStyle/>
           <a:p>
-            <a:endParaRPr lang="en-US"/>
-          </a:p>
-        </p:txBody>
-      </p:sp>
+            <a:r>
+              <a:rPr lang="en-US" dirty="0" smtClean="0"/>
+              <a:t>By Sanjay and Arvind </a:t>
+            </a:r>
+            <a:r>
+              <a:rPr lang="en-US" dirty="0" err="1" smtClean="0"/>
+              <a:t>Seshan</a:t>
+            </a:r>
+            <a:endParaRPr lang="en-US" dirty="0"/>
+          </a:p>
+        </p:txBody>
+      </p:sp>
+      <p:pic>
+        <p:nvPicPr>
+          <p:cNvPr id="4" name="Picture 3"/>
+          <p:cNvPicPr>
+            <a:picLocks noChangeAspect="1"/>
+          </p:cNvPicPr>
+          <p:nvPr/>
+        </p:nvPicPr>
+        <p:blipFill rotWithShape="1">
+          <a:blip r:embed="rId3">
+            <a:extLst>
+              <a:ext uri="{28A0092B-C50C-407E-A947-70E740481C1C}">
+                <a14:useLocalDpi xmlns:a14="http://schemas.microsoft.com/office/drawing/2010/main" val="0"/>
+              </a:ext>
+            </a:extLst>
+          </a:blip>
+          <a:srcRect l="4523" t="17619" r="3095" b="25000"/>
+          <a:stretch/>
+        </p:blipFill>
+        <p:spPr>
+          <a:xfrm>
+            <a:off x="3459013" y="4560129"/>
+            <a:ext cx="2225974" cy="1382629"/>
+          </a:xfrm>
+          <a:prstGeom prst="rect">
+            <a:avLst/>
+          </a:prstGeom>
+        </p:spPr>
+      </p:pic>
     </p:spTree>
     <p:extLst>
       <p:ext uri="{BB962C8B-B14F-4D97-AF65-F5344CB8AC3E}">
@@ -9859,32 +9331,8 @@
           <a:p>
             <a:r>
               <a:rPr lang="sk-SK" smtClean="0"/>
-              <a:t>© 2015 EV3Lessons.com, Last edit 6/15/2015</a:t>
-            </a:r>
-            <a:endParaRPr lang="en-US"/>
-          </a:p>
-        </p:txBody>
-      </p:sp>
-      <p:sp>
-        <p:nvSpPr>
-          <p:cNvPr id="9" name="Slide Number Placeholder 8"/>
-          <p:cNvSpPr>
-            <a:spLocks noGrp="1"/>
-          </p:cNvSpPr>
-          <p:nvPr>
-            <p:ph type="sldNum" sz="quarter" idx="12"/>
-          </p:nvPr>
-        </p:nvSpPr>
-        <p:spPr/>
-        <p:txBody>
-          <a:bodyPr/>
-          <a:lstStyle/>
-          <a:p>
-            <a:fld id="{4382A7F7-08BF-4252-8141-63FB96055BBB}" type="slidenum">
-              <a:rPr lang="en-US" smtClean="0"/>
-              <a:pPr/>
-              <a:t>10</a:t>
-            </a:fld>
+              <a:t>© 2016 EV3Lessons.com, Last edit 7/19/2016</a:t>
+            </a:r>
             <a:endParaRPr lang="en-US"/>
           </a:p>
         </p:txBody>
@@ -10228,29 +9676,6 @@
           </a:p>
           <a:p>
             <a:endParaRPr lang="en-US" dirty="0"/>
-          </a:p>
-        </p:txBody>
-      </p:sp>
-      <p:sp>
-        <p:nvSpPr>
-          <p:cNvPr id="4" name="Slide Number Placeholder 3"/>
-          <p:cNvSpPr>
-            <a:spLocks noGrp="1"/>
-          </p:cNvSpPr>
-          <p:nvPr>
-            <p:ph type="sldNum" sz="quarter" idx="12"/>
-          </p:nvPr>
-        </p:nvSpPr>
-        <p:spPr/>
-        <p:txBody>
-          <a:bodyPr/>
-          <a:lstStyle/>
-          <a:p>
-            <a:fld id="{4382A7F7-08BF-4252-8141-63FB96055BBB}" type="slidenum">
-              <a:rPr lang="en-US" smtClean="0"/>
-              <a:t>11</a:t>
-            </a:fld>
-            <a:endParaRPr lang="en-US"/>
           </a:p>
         </p:txBody>
       </p:sp>
@@ -10387,31 +9812,8 @@
           <a:p>
             <a:r>
               <a:rPr lang="sk-SK" smtClean="0"/>
-              <a:t>© 2015 EV3Lessons.com, Last edit 6/15/2015</a:t>
-            </a:r>
-            <a:endParaRPr lang="en-US"/>
-          </a:p>
-        </p:txBody>
-      </p:sp>
-      <p:sp>
-        <p:nvSpPr>
-          <p:cNvPr id="5" name="Slide Number Placeholder 4"/>
-          <p:cNvSpPr>
-            <a:spLocks noGrp="1"/>
-          </p:cNvSpPr>
-          <p:nvPr>
-            <p:ph type="sldNum" sz="quarter" idx="12"/>
-          </p:nvPr>
-        </p:nvSpPr>
-        <p:spPr/>
-        <p:txBody>
-          <a:bodyPr/>
-          <a:lstStyle/>
-          <a:p>
-            <a:fld id="{4382A7F7-08BF-4252-8141-63FB96055BBB}" type="slidenum">
-              <a:rPr lang="en-US" smtClean="0"/>
-              <a:t>12</a:t>
-            </a:fld>
+              <a:t>© 2016 EV3Lessons.com, Last edit 7/19/2016</a:t>
+            </a:r>
             <a:endParaRPr lang="en-US"/>
           </a:p>
         </p:txBody>
@@ -10517,31 +9919,8 @@
           <a:p>
             <a:r>
               <a:rPr lang="sk-SK" smtClean="0"/>
-              <a:t>© 2015 EV3Lessons.com, Last edit 6/15/2015</a:t>
-            </a:r>
-            <a:endParaRPr lang="en-US"/>
-          </a:p>
-        </p:txBody>
-      </p:sp>
-      <p:sp>
-        <p:nvSpPr>
-          <p:cNvPr id="3" name="Slide Number Placeholder 2"/>
-          <p:cNvSpPr>
-            <a:spLocks noGrp="1"/>
-          </p:cNvSpPr>
-          <p:nvPr>
-            <p:ph type="sldNum" sz="quarter" idx="12"/>
-          </p:nvPr>
-        </p:nvSpPr>
-        <p:spPr/>
-        <p:txBody>
-          <a:bodyPr/>
-          <a:lstStyle/>
-          <a:p>
-            <a:fld id="{4382A7F7-08BF-4252-8141-63FB96055BBB}" type="slidenum">
-              <a:rPr lang="en-US" smtClean="0"/>
-              <a:t>13</a:t>
-            </a:fld>
+              <a:t>© 2016 EV3Lessons.com, Last edit 7/19/2016</a:t>
+            </a:r>
             <a:endParaRPr lang="en-US"/>
           </a:p>
         </p:txBody>
@@ -10892,31 +10271,8 @@
           <a:p>
             <a:r>
               <a:rPr lang="sk-SK" smtClean="0"/>
-              <a:t>© 2015 EV3Lessons.com, Last edit 6/15/2015</a:t>
-            </a:r>
-            <a:endParaRPr lang="en-US"/>
-          </a:p>
-        </p:txBody>
-      </p:sp>
-      <p:sp>
-        <p:nvSpPr>
-          <p:cNvPr id="5" name="Slide Number Placeholder 4"/>
-          <p:cNvSpPr>
-            <a:spLocks noGrp="1"/>
-          </p:cNvSpPr>
-          <p:nvPr>
-            <p:ph type="sldNum" sz="quarter" idx="12"/>
-          </p:nvPr>
-        </p:nvSpPr>
-        <p:spPr/>
-        <p:txBody>
-          <a:bodyPr/>
-          <a:lstStyle/>
-          <a:p>
-            <a:fld id="{4382A7F7-08BF-4252-8141-63FB96055BBB}" type="slidenum">
-              <a:rPr lang="en-US" smtClean="0"/>
-              <a:t>14</a:t>
-            </a:fld>
+              <a:t>© 2016 EV3Lessons.com, Last edit 7/19/2016</a:t>
+            </a:r>
             <a:endParaRPr lang="en-US"/>
           </a:p>
         </p:txBody>
@@ -10998,31 +10354,8 @@
           <a:p>
             <a:r>
               <a:rPr lang="sk-SK" smtClean="0"/>
-              <a:t>© 2015 EV3Lessons.com, Last edit 6/15/2015</a:t>
-            </a:r>
-            <a:endParaRPr lang="en-US"/>
-          </a:p>
-        </p:txBody>
-      </p:sp>
-      <p:sp>
-        <p:nvSpPr>
-          <p:cNvPr id="5" name="Slide Number Placeholder 4"/>
-          <p:cNvSpPr>
-            <a:spLocks noGrp="1"/>
-          </p:cNvSpPr>
-          <p:nvPr>
-            <p:ph type="sldNum" sz="quarter" idx="12"/>
-          </p:nvPr>
-        </p:nvSpPr>
-        <p:spPr/>
-        <p:txBody>
-          <a:bodyPr/>
-          <a:lstStyle/>
-          <a:p>
-            <a:fld id="{4382A7F7-08BF-4252-8141-63FB96055BBB}" type="slidenum">
-              <a:rPr lang="en-US" smtClean="0"/>
-              <a:t>15</a:t>
-            </a:fld>
+              <a:t>© 2016 EV3Lessons.com, Last edit 7/19/2016</a:t>
+            </a:r>
             <a:endParaRPr lang="en-US"/>
           </a:p>
         </p:txBody>
@@ -11336,31 +10669,8 @@
           <a:p>
             <a:r>
               <a:rPr lang="sk-SK" smtClean="0"/>
-              <a:t>© 2015 EV3Lessons.com, Last edit 6/15/2015</a:t>
-            </a:r>
-            <a:endParaRPr lang="en-US"/>
-          </a:p>
-        </p:txBody>
-      </p:sp>
-      <p:sp>
-        <p:nvSpPr>
-          <p:cNvPr id="4" name="Slide Number Placeholder 3"/>
-          <p:cNvSpPr>
-            <a:spLocks noGrp="1"/>
-          </p:cNvSpPr>
-          <p:nvPr>
-            <p:ph type="sldNum" sz="quarter" idx="12"/>
-          </p:nvPr>
-        </p:nvSpPr>
-        <p:spPr/>
-        <p:txBody>
-          <a:bodyPr/>
-          <a:lstStyle/>
-          <a:p>
-            <a:fld id="{4382A7F7-08BF-4252-8141-63FB96055BBB}" type="slidenum">
-              <a:rPr lang="en-US" smtClean="0"/>
-              <a:t>16</a:t>
-            </a:fld>
+              <a:t>© 2016 EV3Lessons.com, Last edit 7/19/2016</a:t>
+            </a:r>
             <a:endParaRPr lang="en-US"/>
           </a:p>
         </p:txBody>
@@ -11442,15 +10752,36 @@
           <a:p>
             <a:pPr lvl="1"/>
             <a:r>
+              <a:rPr lang="en-US" dirty="0" smtClean="0"/>
+              <a:t>This tutorial was written by Sanjay </a:t>
+            </a:r>
+            <a:r>
+              <a:rPr lang="en-US" dirty="0" err="1" smtClean="0"/>
+              <a:t>Seshan</a:t>
+            </a:r>
+            <a:r>
+              <a:rPr lang="en-US" dirty="0" smtClean="0"/>
+              <a:t> and Arvind </a:t>
+            </a:r>
+            <a:r>
+              <a:rPr lang="en-US" dirty="0" err="1" smtClean="0"/>
+              <a:t>Seshan</a:t>
+            </a:r>
+            <a:r>
               <a:rPr lang="en-US" smtClean="0"/>
-              <a:t>This tutorial was written by Sanjay Seshan and Arvind Seshan from Droids Robotics </a:t>
-            </a:r>
+              <a:t> </a:t>
+            </a:r>
+            <a:endParaRPr lang="en-US" smtClean="0"/>
           </a:p>
           <a:p>
             <a:pPr lvl="1"/>
             <a:r>
               <a:rPr lang="en-US" smtClean="0"/>
-              <a:t>More lessons at www.ev3lessons.com</a:t>
+              <a:t>More </a:t>
+            </a:r>
+            <a:r>
+              <a:rPr lang="en-US" dirty="0" smtClean="0"/>
+              <a:t>lessons at www.ev3lessons.com</a:t>
             </a:r>
             <a:endParaRPr lang="en-US" dirty="0"/>
           </a:p>
@@ -11473,32 +10804,8 @@
           <a:p>
             <a:r>
               <a:rPr lang="sk-SK" smtClean="0"/>
-              <a:t>© 2015 EV3Lessons.com, Last edit 6/15/2015</a:t>
-            </a:r>
-            <a:endParaRPr lang="en-US"/>
-          </a:p>
-        </p:txBody>
-      </p:sp>
-      <p:sp>
-        <p:nvSpPr>
-          <p:cNvPr id="7" name="Slide Number Placeholder 6"/>
-          <p:cNvSpPr>
-            <a:spLocks noGrp="1"/>
-          </p:cNvSpPr>
-          <p:nvPr>
-            <p:ph type="sldNum" sz="quarter" idx="12"/>
-          </p:nvPr>
-        </p:nvSpPr>
-        <p:spPr/>
-        <p:txBody>
-          <a:bodyPr/>
-          <a:lstStyle/>
-          <a:p>
-            <a:fld id="{4382A7F7-08BF-4252-8141-63FB96055BBB}" type="slidenum">
-              <a:rPr lang="en-US" smtClean="0"/>
-              <a:pPr/>
-              <a:t>17</a:t>
-            </a:fld>
+              <a:t>© 2016 EV3Lessons.com, Last edit 7/19/2016</a:t>
+            </a:r>
             <a:endParaRPr lang="en-US"/>
           </a:p>
         </p:txBody>
@@ -11551,7 +10858,7 @@
           <a:effectLst/>
           <a:extLst>
             <a:ext uri="{91240B29-F687-4f45-9708-019B960494DF}">
-              <a14:hiddenLine xmlns="" xmlns:a14="http://schemas.microsoft.com/office/drawing/2010/main" w="9525">
+              <a14:hiddenLine xmlns:a14="http://schemas.microsoft.com/office/drawing/2010/main" xmlns="" w="9525">
                 <a:solidFill>
                   <a:schemeClr val="tx1"/>
                 </a:solidFill>
@@ -11561,7 +10868,7 @@
               </a14:hiddenLine>
             </a:ext>
             <a:ext uri="{AF507438-7753-43e0-B8FC-AC1667EBCBE1}">
-              <a14:hiddenEffects xmlns="" xmlns:a14="http://schemas.microsoft.com/office/drawing/2010/main">
+              <a14:hiddenEffects xmlns:a14="http://schemas.microsoft.com/office/drawing/2010/main" xmlns="">
                 <a:effectLst>
                   <a:outerShdw dist="35921" dir="2700000" algn="ctr" rotWithShape="0">
                     <a:schemeClr val="bg2"/>
@@ -11914,7 +11221,7 @@
           <a:noFill/>
           <a:extLst>
             <a:ext uri="{909E8E84-426E-40dd-AFC4-6F175D3DCCD1}">
-              <a14:hiddenFill xmlns="" xmlns:a14="http://schemas.microsoft.com/office/drawing/2010/main">
+              <a14:hiddenFill xmlns:a14="http://schemas.microsoft.com/office/drawing/2010/main" xmlns="">
                 <a:solidFill>
                   <a:srgbClr val="FFFFFF"/>
                 </a:solidFill>
@@ -12035,32 +11342,8 @@
           <a:p>
             <a:r>
               <a:rPr lang="sk-SK" smtClean="0"/>
-              <a:t>© 2015 EV3Lessons.com, Last edit 6/15/2015</a:t>
-            </a:r>
-            <a:endParaRPr lang="en-US"/>
-          </a:p>
-        </p:txBody>
-      </p:sp>
-      <p:sp>
-        <p:nvSpPr>
-          <p:cNvPr id="5" name="Slide Number Placeholder 4"/>
-          <p:cNvSpPr>
-            <a:spLocks noGrp="1"/>
-          </p:cNvSpPr>
-          <p:nvPr>
-            <p:ph type="sldNum" sz="quarter" idx="12"/>
-          </p:nvPr>
-        </p:nvSpPr>
-        <p:spPr/>
-        <p:txBody>
-          <a:bodyPr/>
-          <a:lstStyle/>
-          <a:p>
-            <a:fld id="{4382A7F7-08BF-4252-8141-63FB96055BBB}" type="slidenum">
-              <a:rPr lang="en-US" smtClean="0"/>
-              <a:pPr/>
-              <a:t>2</a:t>
-            </a:fld>
+              <a:t>© 2016 EV3Lessons.com, Last edit 7/19/2016</a:t>
+            </a:r>
             <a:endParaRPr lang="en-US"/>
           </a:p>
         </p:txBody>
@@ -12189,31 +11472,8 @@
           <a:p>
             <a:r>
               <a:rPr lang="sk-SK" smtClean="0"/>
-              <a:t>© 2015 EV3Lessons.com, Last edit 6/15/2015</a:t>
-            </a:r>
-            <a:endParaRPr lang="en-US"/>
-          </a:p>
-        </p:txBody>
-      </p:sp>
-      <p:sp>
-        <p:nvSpPr>
-          <p:cNvPr id="5" name="Slide Number Placeholder 4"/>
-          <p:cNvSpPr>
-            <a:spLocks noGrp="1"/>
-          </p:cNvSpPr>
-          <p:nvPr>
-            <p:ph type="sldNum" sz="quarter" idx="12"/>
-          </p:nvPr>
-        </p:nvSpPr>
-        <p:spPr/>
-        <p:txBody>
-          <a:bodyPr/>
-          <a:lstStyle/>
-          <a:p>
-            <a:fld id="{4382A7F7-08BF-4252-8141-63FB96055BBB}" type="slidenum">
-              <a:rPr lang="en-US" smtClean="0"/>
-              <a:t>3</a:t>
-            </a:fld>
+              <a:t>© 2016 EV3Lessons.com, Last edit 7/19/2016</a:t>
+            </a:r>
             <a:endParaRPr lang="en-US"/>
           </a:p>
         </p:txBody>
@@ -12367,32 +11627,9 @@
           <a:p>
             <a:r>
               <a:rPr lang="sk-SK" smtClean="0"/>
-              <a:t>© 2015 EV3Lessons.com, Last edit 6/15/2015</a:t>
+              <a:t>© 2016 EV3Lessons.com, Last edit 7/19/2016</a:t>
             </a:r>
             <a:endParaRPr lang="en-US"/>
-          </a:p>
-        </p:txBody>
-      </p:sp>
-      <p:sp>
-        <p:nvSpPr>
-          <p:cNvPr id="5" name="Slide Number Placeholder 4"/>
-          <p:cNvSpPr>
-            <a:spLocks noGrp="1"/>
-          </p:cNvSpPr>
-          <p:nvPr>
-            <p:ph type="sldNum" sz="quarter" idx="12"/>
-          </p:nvPr>
-        </p:nvSpPr>
-        <p:spPr/>
-        <p:txBody>
-          <a:bodyPr/>
-          <a:lstStyle/>
-          <a:p>
-            <a:fld id="{4382A7F7-08BF-4252-8141-63FB96055BBB}" type="slidenum">
-              <a:rPr lang="en-US" smtClean="0"/>
-              <a:t>4</a:t>
-            </a:fld>
-            <a:endParaRPr lang="en-US" dirty="0"/>
           </a:p>
         </p:txBody>
       </p:sp>
@@ -12610,32 +11847,8 @@
           <a:p>
             <a:r>
               <a:rPr lang="sk-SK" smtClean="0"/>
-              <a:t>© 2015 EV3Lessons.com, Last edit 6/15/2015</a:t>
-            </a:r>
-            <a:endParaRPr lang="en-US"/>
-          </a:p>
-        </p:txBody>
-      </p:sp>
-      <p:sp>
-        <p:nvSpPr>
-          <p:cNvPr id="35" name="Slide Number Placeholder 34"/>
-          <p:cNvSpPr>
-            <a:spLocks noGrp="1"/>
-          </p:cNvSpPr>
-          <p:nvPr>
-            <p:ph type="sldNum" sz="quarter" idx="12"/>
-          </p:nvPr>
-        </p:nvSpPr>
-        <p:spPr/>
-        <p:txBody>
-          <a:bodyPr/>
-          <a:lstStyle/>
-          <a:p>
-            <a:fld id="{4382A7F7-08BF-4252-8141-63FB96055BBB}" type="slidenum">
-              <a:rPr lang="en-US" smtClean="0"/>
-              <a:pPr/>
-              <a:t>5</a:t>
-            </a:fld>
+              <a:t>© 2016 EV3Lessons.com, Last edit 7/19/2016</a:t>
+            </a:r>
             <a:endParaRPr lang="en-US"/>
           </a:p>
         </p:txBody>
@@ -16326,31 +15539,8 @@
           <a:p>
             <a:r>
               <a:rPr lang="sk-SK" smtClean="0"/>
-              <a:t>© 2015 EV3Lessons.com, Last edit 6/15/2015</a:t>
-            </a:r>
-            <a:endParaRPr lang="en-US"/>
-          </a:p>
-        </p:txBody>
-      </p:sp>
-      <p:sp>
-        <p:nvSpPr>
-          <p:cNvPr id="14" name="Slide Number Placeholder 13"/>
-          <p:cNvSpPr>
-            <a:spLocks noGrp="1"/>
-          </p:cNvSpPr>
-          <p:nvPr>
-            <p:ph type="sldNum" sz="quarter" idx="12"/>
-          </p:nvPr>
-        </p:nvSpPr>
-        <p:spPr/>
-        <p:txBody>
-          <a:bodyPr/>
-          <a:lstStyle/>
-          <a:p>
-            <a:fld id="{4382A7F7-08BF-4252-8141-63FB96055BBB}" type="slidenum">
-              <a:rPr lang="en-US" smtClean="0"/>
-              <a:t>6</a:t>
-            </a:fld>
+              <a:t>© 2016 EV3Lessons.com, Last edit 7/19/2016</a:t>
+            </a:r>
             <a:endParaRPr lang="en-US"/>
           </a:p>
         </p:txBody>
@@ -16935,32 +16125,8 @@
           <a:p>
             <a:r>
               <a:rPr lang="sk-SK" smtClean="0"/>
-              <a:t>© 2015 EV3Lessons.com, Last edit 6/15/2015</a:t>
-            </a:r>
-            <a:endParaRPr lang="en-US"/>
-          </a:p>
-        </p:txBody>
-      </p:sp>
-      <p:sp>
-        <p:nvSpPr>
-          <p:cNvPr id="8" name="Slide Number Placeholder 7"/>
-          <p:cNvSpPr>
-            <a:spLocks noGrp="1"/>
-          </p:cNvSpPr>
-          <p:nvPr>
-            <p:ph type="sldNum" sz="quarter" idx="12"/>
-          </p:nvPr>
-        </p:nvSpPr>
-        <p:spPr/>
-        <p:txBody>
-          <a:bodyPr/>
-          <a:lstStyle/>
-          <a:p>
-            <a:fld id="{4382A7F7-08BF-4252-8141-63FB96055BBB}" type="slidenum">
-              <a:rPr lang="en-US" smtClean="0"/>
-              <a:pPr/>
-              <a:t>7</a:t>
-            </a:fld>
+              <a:t>© 2016 EV3Lessons.com, Last edit 7/19/2016</a:t>
+            </a:r>
             <a:endParaRPr lang="en-US"/>
           </a:p>
         </p:txBody>
@@ -17129,31 +16295,8 @@
           <a:p>
             <a:r>
               <a:rPr lang="sk-SK" smtClean="0"/>
-              <a:t>© 2015 EV3Lessons.com, Last edit 6/15/2015</a:t>
-            </a:r>
-            <a:endParaRPr lang="en-US"/>
-          </a:p>
-        </p:txBody>
-      </p:sp>
-      <p:sp>
-        <p:nvSpPr>
-          <p:cNvPr id="14" name="Slide Number Placeholder 13"/>
-          <p:cNvSpPr>
-            <a:spLocks noGrp="1"/>
-          </p:cNvSpPr>
-          <p:nvPr>
-            <p:ph type="sldNum" sz="quarter" idx="12"/>
-          </p:nvPr>
-        </p:nvSpPr>
-        <p:spPr/>
-        <p:txBody>
-          <a:bodyPr/>
-          <a:lstStyle/>
-          <a:p>
-            <a:fld id="{4382A7F7-08BF-4252-8141-63FB96055BBB}" type="slidenum">
-              <a:rPr lang="en-US" smtClean="0"/>
-              <a:t>8</a:t>
-            </a:fld>
+              <a:t>© 2016 EV3Lessons.com, Last edit 7/19/2016</a:t>
+            </a:r>
             <a:endParaRPr lang="en-US"/>
           </a:p>
         </p:txBody>
@@ -17703,31 +16846,8 @@
           <a:p>
             <a:r>
               <a:rPr lang="sk-SK" smtClean="0"/>
-              <a:t>© 2015 EV3Lessons.com, Last edit 6/15/2015</a:t>
-            </a:r>
-            <a:endParaRPr lang="en-US"/>
-          </a:p>
-        </p:txBody>
-      </p:sp>
-      <p:sp>
-        <p:nvSpPr>
-          <p:cNvPr id="3" name="Slide Number Placeholder 2"/>
-          <p:cNvSpPr>
-            <a:spLocks noGrp="1"/>
-          </p:cNvSpPr>
-          <p:nvPr>
-            <p:ph type="sldNum" sz="quarter" idx="12"/>
-          </p:nvPr>
-        </p:nvSpPr>
-        <p:spPr/>
-        <p:txBody>
-          <a:bodyPr/>
-          <a:lstStyle/>
-          <a:p>
-            <a:fld id="{4382A7F7-08BF-4252-8141-63FB96055BBB}" type="slidenum">
-              <a:rPr lang="en-US" smtClean="0"/>
-              <a:t>9</a:t>
-            </a:fld>
+              <a:t>© 2016 EV3Lessons.com, Last edit 7/19/2016</a:t>
+            </a:r>
             <a:endParaRPr lang="en-US"/>
           </a:p>
         </p:txBody>

</xml_diff>